<commit_message>
add icon for q table training
</commit_message>
<xml_diff>
--- a/CS 5100 Final Presentation.pptx
+++ b/CS 5100 Final Presentation.pptx
@@ -281,7 +281,7 @@
           <a:p>
             <a:fld id="{8F7DC034-8B59-9E4A-9FEF-133636534C87}" type="datetimeFigureOut">
               <a:rPr lang="en-US" smtClean="0"/>
-              <a:t>3/18/25</a:t>
+              <a:t>3/19/25</a:t>
             </a:fld>
             <a:endParaRPr lang="en-US"/>
           </a:p>
@@ -632,6 +632,90 @@
 </p:notes>
 </file>
 
+<file path=ppt/notesSlides/notesSlide2.xml><?xml version="1.0" encoding="utf-8"?>
+<p:notes xmlns:a="http://schemas.openxmlformats.org/drawingml/2006/main" xmlns:r="http://schemas.openxmlformats.org/officeDocument/2006/relationships" xmlns:p="http://schemas.openxmlformats.org/presentationml/2006/main">
+  <p:cSld>
+    <p:spTree>
+      <p:nvGrpSpPr>
+        <p:cNvPr id="1" name=""/>
+        <p:cNvGrpSpPr/>
+        <p:nvPr/>
+      </p:nvGrpSpPr>
+      <p:grpSpPr>
+        <a:xfrm>
+          <a:off x="0" y="0"/>
+          <a:ext cx="0" cy="0"/>
+          <a:chOff x="0" y="0"/>
+          <a:chExt cx="0" cy="0"/>
+        </a:xfrm>
+      </p:grpSpPr>
+      <p:sp>
+        <p:nvSpPr>
+          <p:cNvPr id="2" name="Slide Image Placeholder 1"/>
+          <p:cNvSpPr>
+            <a:spLocks noGrp="1" noRot="1" noChangeAspect="1"/>
+          </p:cNvSpPr>
+          <p:nvPr>
+            <p:ph type="sldImg"/>
+          </p:nvPr>
+        </p:nvSpPr>
+        <p:spPr/>
+      </p:sp>
+      <p:sp>
+        <p:nvSpPr>
+          <p:cNvPr id="3" name="Notes Placeholder 2"/>
+          <p:cNvSpPr>
+            <a:spLocks noGrp="1"/>
+          </p:cNvSpPr>
+          <p:nvPr>
+            <p:ph type="body" idx="1"/>
+          </p:nvPr>
+        </p:nvSpPr>
+        <p:spPr/>
+        <p:txBody>
+          <a:bodyPr/>
+          <a:lstStyle/>
+          <a:p>
+            <a:endParaRPr lang="en-US" dirty="0"/>
+          </a:p>
+        </p:txBody>
+      </p:sp>
+      <p:sp>
+        <p:nvSpPr>
+          <p:cNvPr id="4" name="Slide Number Placeholder 3"/>
+          <p:cNvSpPr>
+            <a:spLocks noGrp="1"/>
+          </p:cNvSpPr>
+          <p:nvPr>
+            <p:ph type="sldNum" sz="quarter" idx="5"/>
+          </p:nvPr>
+        </p:nvSpPr>
+        <p:spPr/>
+        <p:txBody>
+          <a:bodyPr/>
+          <a:lstStyle/>
+          <a:p>
+            <a:fld id="{D4846416-9298-D044-BEC4-B022F3DC5BC0}" type="slidenum">
+              <a:rPr lang="en-US" smtClean="0"/>
+              <a:t>16</a:t>
+            </a:fld>
+            <a:endParaRPr lang="en-US"/>
+          </a:p>
+        </p:txBody>
+      </p:sp>
+    </p:spTree>
+    <p:extLst>
+      <p:ext uri="{BB962C8B-B14F-4D97-AF65-F5344CB8AC3E}">
+        <p14:creationId xmlns:p14="http://schemas.microsoft.com/office/powerpoint/2010/main" val="2757332674"/>
+      </p:ext>
+    </p:extLst>
+  </p:cSld>
+  <p:clrMapOvr>
+    <a:masterClrMapping/>
+  </p:clrMapOvr>
+</p:notes>
+</file>
+
 <file path=ppt/slideLayouts/slideLayout1.xml><?xml version="1.0" encoding="utf-8"?>
 <p:sldLayout xmlns:a="http://schemas.openxmlformats.org/drawingml/2006/main" xmlns:r="http://schemas.openxmlformats.org/officeDocument/2006/relationships" xmlns:p="http://schemas.openxmlformats.org/presentationml/2006/main" type="title" preserve="1">
   <p:cSld name="Title Slide">
@@ -763,7 +847,7 @@
           <a:p>
             <a:fld id="{A03AB63C-02C7-0448-827D-0E50534AC752}" type="datetimeFigureOut">
               <a:rPr lang="en-US" smtClean="0"/>
-              <a:t>3/18/25</a:t>
+              <a:t>3/19/25</a:t>
             </a:fld>
             <a:endParaRPr lang="en-US"/>
           </a:p>
@@ -933,7 +1017,7 @@
           <a:p>
             <a:fld id="{A03AB63C-02C7-0448-827D-0E50534AC752}" type="datetimeFigureOut">
               <a:rPr lang="en-US" smtClean="0"/>
-              <a:t>3/18/25</a:t>
+              <a:t>3/19/25</a:t>
             </a:fld>
             <a:endParaRPr lang="en-US"/>
           </a:p>
@@ -1113,7 +1197,7 @@
           <a:p>
             <a:fld id="{A03AB63C-02C7-0448-827D-0E50534AC752}" type="datetimeFigureOut">
               <a:rPr lang="en-US" smtClean="0"/>
-              <a:t>3/18/25</a:t>
+              <a:t>3/19/25</a:t>
             </a:fld>
             <a:endParaRPr lang="en-US"/>
           </a:p>
@@ -1299,7 +1383,7 @@
           <a:p>
             <a:fld id="{A03AB63C-02C7-0448-827D-0E50534AC752}" type="datetimeFigureOut">
               <a:rPr lang="en-US" smtClean="0"/>
-              <a:t>3/18/25</a:t>
+              <a:t>3/19/25</a:t>
             </a:fld>
             <a:endParaRPr lang="en-US"/>
           </a:p>
@@ -2764,7 +2848,7 @@
           <a:p>
             <a:fld id="{147DA8C2-B5DF-8747-A0E3-3E6516BCD0DA}" type="datetimeFigureOut">
               <a:rPr lang="en-US" smtClean="0"/>
-              <a:t>3/18/25</a:t>
+              <a:t>3/19/25</a:t>
             </a:fld>
             <a:endParaRPr lang="en-US"/>
           </a:p>
@@ -2950,7 +3034,7 @@
           <a:p>
             <a:fld id="{A03AB63C-02C7-0448-827D-0E50534AC752}" type="datetimeFigureOut">
               <a:rPr lang="en-US" smtClean="0"/>
-              <a:t>3/18/25</a:t>
+              <a:t>3/19/25</a:t>
             </a:fld>
             <a:endParaRPr lang="en-US"/>
           </a:p>
@@ -3196,7 +3280,7 @@
           <a:p>
             <a:fld id="{A03AB63C-02C7-0448-827D-0E50534AC752}" type="datetimeFigureOut">
               <a:rPr lang="en-US" smtClean="0"/>
-              <a:t>3/18/25</a:t>
+              <a:t>3/19/25</a:t>
             </a:fld>
             <a:endParaRPr lang="en-US"/>
           </a:p>
@@ -3428,7 +3512,7 @@
           <a:p>
             <a:fld id="{A03AB63C-02C7-0448-827D-0E50534AC752}" type="datetimeFigureOut">
               <a:rPr lang="en-US" smtClean="0"/>
-              <a:t>3/18/25</a:t>
+              <a:t>3/19/25</a:t>
             </a:fld>
             <a:endParaRPr lang="en-US"/>
           </a:p>
@@ -3795,7 +3879,7 @@
           <a:p>
             <a:fld id="{A03AB63C-02C7-0448-827D-0E50534AC752}" type="datetimeFigureOut">
               <a:rPr lang="en-US" smtClean="0"/>
-              <a:t>3/18/25</a:t>
+              <a:t>3/19/25</a:t>
             </a:fld>
             <a:endParaRPr lang="en-US"/>
           </a:p>
@@ -3913,7 +3997,7 @@
           <a:p>
             <a:fld id="{A03AB63C-02C7-0448-827D-0E50534AC752}" type="datetimeFigureOut">
               <a:rPr lang="en-US" smtClean="0"/>
-              <a:t>3/18/25</a:t>
+              <a:t>3/19/25</a:t>
             </a:fld>
             <a:endParaRPr lang="en-US"/>
           </a:p>
@@ -4008,7 +4092,7 @@
           <a:p>
             <a:fld id="{A03AB63C-02C7-0448-827D-0E50534AC752}" type="datetimeFigureOut">
               <a:rPr lang="en-US" smtClean="0"/>
-              <a:t>3/18/25</a:t>
+              <a:t>3/19/25</a:t>
             </a:fld>
             <a:endParaRPr lang="en-US"/>
           </a:p>
@@ -4285,7 +4369,7 @@
           <a:p>
             <a:fld id="{A03AB63C-02C7-0448-827D-0E50534AC752}" type="datetimeFigureOut">
               <a:rPr lang="en-US" smtClean="0"/>
-              <a:t>3/18/25</a:t>
+              <a:t>3/19/25</a:t>
             </a:fld>
             <a:endParaRPr lang="en-US"/>
           </a:p>
@@ -4542,7 +4626,7 @@
           <a:p>
             <a:fld id="{A03AB63C-02C7-0448-827D-0E50534AC752}" type="datetimeFigureOut">
               <a:rPr lang="en-US" smtClean="0"/>
-              <a:t>3/18/25</a:t>
+              <a:t>3/19/25</a:t>
             </a:fld>
             <a:endParaRPr lang="en-US"/>
           </a:p>
@@ -4757,7 +4841,7 @@
             <a:fld id="{A03AB63C-02C7-0448-827D-0E50534AC752}" type="datetimeFigureOut">
               <a:rPr lang="en-US" smtClean="0"/>
               <a:pPr/>
-              <a:t>3/18/25</a:t>
+              <a:t>3/19/25</a:t>
             </a:fld>
             <a:endParaRPr lang="en-US"/>
           </a:p>
@@ -10477,7 +10561,7 @@
             <p:ph idx="1"/>
             <p:extLst>
               <p:ext uri="{D42A27DB-BD31-4B8C-83A1-F6EECF244321}">
-                <p14:modId xmlns:p14="http://schemas.microsoft.com/office/powerpoint/2010/main" val="2335643508"/>
+                <p14:modId xmlns:p14="http://schemas.microsoft.com/office/powerpoint/2010/main" val="1028426270"/>
               </p:ext>
             </p:extLst>
           </p:nvPr>
@@ -10604,14 +10688,14 @@
                       <a:pPr algn="ctr"/>
                       <a:r>
                         <a:rPr lang="en-US" dirty="0"/>
-                        <a:t>#</a:t>
+                        <a:t>Match Number</a:t>
                       </a:r>
                     </a:p>
                     <a:p>
                       <a:pPr algn="ctr"/>
                       <a:r>
                         <a:rPr lang="en-US" dirty="0"/>
-                        <a:t>Color</a:t>
+                        <a:t>Match Color</a:t>
                       </a:r>
                     </a:p>
                     <a:p>
@@ -10639,7 +10723,14 @@
                       <a:pPr algn="ctr"/>
                       <a:r>
                         <a:rPr lang="en-US" dirty="0"/>
-                        <a:t>Wild+4</a:t>
+                        <a:t>+4</a:t>
+                      </a:r>
+                    </a:p>
+                    <a:p>
+                      <a:pPr algn="ctr"/>
+                      <a:r>
+                        <a:rPr lang="en-US" dirty="0"/>
+                        <a:t>Wild</a:t>
                       </a:r>
                     </a:p>
                   </a:txBody>
@@ -12199,7 +12290,7 @@
         </p:nvSpPr>
         <p:spPr/>
         <p:txBody>
-          <a:bodyPr/>
+          <a:bodyPr anchor="ctr"/>
           <a:lstStyle/>
           <a:p>
             <a:r>
@@ -12216,6 +12307,12 @@
             </a:r>
           </a:p>
           <a:p>
+            <a:pPr marL="0" indent="0">
+              <a:buNone/>
+            </a:pPr>
+            <a:endParaRPr lang="en-US" dirty="0"/>
+          </a:p>
+          <a:p>
             <a:r>
               <a:rPr lang="en-US" dirty="0"/>
               <a:t>Apply Epsilon Greedy to shift from random moves to optimal moves throughout training</a:t>
@@ -12223,55 +12320,172 @@
           </a:p>
         </p:txBody>
       </p:sp>
-      <p:sp>
-        <p:nvSpPr>
-          <p:cNvPr id="10" name="Folded Corner 9">
+      <p:grpSp>
+        <p:nvGrpSpPr>
+          <p:cNvPr id="13" name="Group 12">
             <a:extLst>
               <a:ext uri="{FF2B5EF4-FFF2-40B4-BE49-F238E27FC236}">
-                <a16:creationId xmlns:a16="http://schemas.microsoft.com/office/drawing/2014/main" id="{ED1EACEF-D1E1-2061-2A2D-D4BCBBE2E04F}"/>
+                <a16:creationId xmlns:a16="http://schemas.microsoft.com/office/drawing/2014/main" id="{D5F998D5-FA39-CE8F-F919-1CB6FF95EB13}"/>
               </a:ext>
             </a:extLst>
           </p:cNvPr>
-          <p:cNvSpPr/>
+          <p:cNvGrpSpPr/>
           <p:nvPr/>
-        </p:nvSpPr>
-        <p:spPr>
+        </p:nvGrpSpPr>
+        <p:grpSpPr>
           <a:xfrm>
-            <a:off x="7419371" y="2083442"/>
-            <a:ext cx="3229337" cy="2627453"/>
+            <a:off x="6765020" y="1600800"/>
+            <a:ext cx="4585779" cy="4576163"/>
+            <a:chOff x="8108225" y="875713"/>
+            <a:chExt cx="3132149" cy="3125581"/>
           </a:xfrm>
-          <a:prstGeom prst="foldedCorner">
-            <a:avLst/>
-          </a:prstGeom>
-        </p:spPr>
-        <p:style>
-          <a:lnRef idx="2">
-            <a:schemeClr val="accent1">
-              <a:shade val="15000"/>
-            </a:schemeClr>
-          </a:lnRef>
-          <a:fillRef idx="1">
-            <a:schemeClr val="accent1"/>
-          </a:fillRef>
-          <a:effectRef idx="0">
-            <a:schemeClr val="accent1"/>
-          </a:effectRef>
-          <a:fontRef idx="minor">
-            <a:schemeClr val="lt1"/>
-          </a:fontRef>
-        </p:style>
-        <p:txBody>
-          <a:bodyPr rtlCol="0" anchor="ctr"/>
-          <a:lstStyle/>
-          <a:p>
-            <a:pPr algn="ctr"/>
-            <a:r>
-              <a:rPr lang="en-US" dirty="0"/>
-              <a:t>Add some visualization of the training here</a:t>
-            </a:r>
-          </a:p>
-        </p:txBody>
-      </p:sp>
+        </p:grpSpPr>
+        <p:pic>
+          <p:nvPicPr>
+            <p:cNvPr id="3" name="Graphic 2" descr="Table with solid fill">
+              <a:extLst>
+                <a:ext uri="{FF2B5EF4-FFF2-40B4-BE49-F238E27FC236}">
+                  <a16:creationId xmlns:a16="http://schemas.microsoft.com/office/drawing/2014/main" id="{49112906-CD4F-FB36-2DF4-53BF2E2CB1E0}"/>
+                </a:ext>
+              </a:extLst>
+            </p:cNvPr>
+            <p:cNvPicPr>
+              <a:picLocks noChangeAspect="1"/>
+            </p:cNvPicPr>
+            <p:nvPr/>
+          </p:nvPicPr>
+          <p:blipFill>
+            <a:blip r:embed="rId2">
+              <a:extLst>
+                <a:ext uri="{96DAC541-7B7A-43D3-8B79-37D633B846F1}">
+                  <asvg:svgBlip xmlns:asvg="http://schemas.microsoft.com/office/drawing/2016/SVG/main" r:embed="rId3"/>
+                </a:ext>
+              </a:extLst>
+            </a:blip>
+            <a:stretch>
+              <a:fillRect/>
+            </a:stretch>
+          </p:blipFill>
+          <p:spPr>
+            <a:xfrm>
+              <a:off x="8221651" y="875713"/>
+              <a:ext cx="3018723" cy="3018723"/>
+            </a:xfrm>
+            <a:prstGeom prst="rect">
+              <a:avLst/>
+            </a:prstGeom>
+          </p:spPr>
+        </p:pic>
+        <p:grpSp>
+          <p:nvGrpSpPr>
+            <p:cNvPr id="12" name="Group 11">
+              <a:extLst>
+                <a:ext uri="{FF2B5EF4-FFF2-40B4-BE49-F238E27FC236}">
+                  <a16:creationId xmlns:a16="http://schemas.microsoft.com/office/drawing/2014/main" id="{7BADB91F-FA7E-494D-554B-A0A787B0D03A}"/>
+                </a:ext>
+              </a:extLst>
+            </p:cNvPr>
+            <p:cNvGrpSpPr/>
+            <p:nvPr/>
+          </p:nvGrpSpPr>
+          <p:grpSpPr>
+            <a:xfrm>
+              <a:off x="8108225" y="2234197"/>
+              <a:ext cx="1767097" cy="1767097"/>
+              <a:chOff x="6923315" y="3040083"/>
+              <a:chExt cx="1327646" cy="1327646"/>
+            </a:xfrm>
+          </p:grpSpPr>
+          <p:sp>
+            <p:nvSpPr>
+              <p:cNvPr id="11" name="Oval 10">
+                <a:extLst>
+                  <a:ext uri="{FF2B5EF4-FFF2-40B4-BE49-F238E27FC236}">
+                    <a16:creationId xmlns:a16="http://schemas.microsoft.com/office/drawing/2014/main" id="{3A4D65B1-1CEA-788C-DCEC-F47B2298761E}"/>
+                  </a:ext>
+                </a:extLst>
+              </p:cNvPr>
+              <p:cNvSpPr/>
+              <p:nvPr/>
+            </p:nvSpPr>
+            <p:spPr>
+              <a:xfrm>
+                <a:off x="6923315" y="3040083"/>
+                <a:ext cx="1327646" cy="1327646"/>
+              </a:xfrm>
+              <a:prstGeom prst="ellipse">
+                <a:avLst/>
+              </a:prstGeom>
+              <a:solidFill>
+                <a:schemeClr val="bg2"/>
+              </a:solidFill>
+              <a:ln>
+                <a:noFill/>
+              </a:ln>
+            </p:spPr>
+            <p:style>
+              <a:lnRef idx="2">
+                <a:schemeClr val="accent1">
+                  <a:shade val="15000"/>
+                </a:schemeClr>
+              </a:lnRef>
+              <a:fillRef idx="1">
+                <a:schemeClr val="accent1"/>
+              </a:fillRef>
+              <a:effectRef idx="0">
+                <a:schemeClr val="accent1"/>
+              </a:effectRef>
+              <a:fontRef idx="minor">
+                <a:schemeClr val="lt1"/>
+              </a:fontRef>
+            </p:style>
+            <p:txBody>
+              <a:bodyPr rtlCol="0" anchor="ctr"/>
+              <a:lstStyle/>
+              <a:p>
+                <a:pPr algn="ctr"/>
+                <a:endParaRPr lang="en-US"/>
+              </a:p>
+            </p:txBody>
+          </p:sp>
+          <p:pic>
+            <p:nvPicPr>
+              <p:cNvPr id="9" name="Graphic 8" descr="Repeat with solid fill">
+                <a:extLst>
+                  <a:ext uri="{FF2B5EF4-FFF2-40B4-BE49-F238E27FC236}">
+                    <a16:creationId xmlns:a16="http://schemas.microsoft.com/office/drawing/2014/main" id="{6DA1FE40-892C-ED2D-3C8C-FC00FDA69D48}"/>
+                  </a:ext>
+                </a:extLst>
+              </p:cNvPr>
+              <p:cNvPicPr>
+                <a:picLocks noChangeAspect="1"/>
+              </p:cNvPicPr>
+              <p:nvPr/>
+            </p:nvPicPr>
+            <p:blipFill>
+              <a:blip r:embed="rId4">
+                <a:extLst>
+                  <a:ext uri="{96DAC541-7B7A-43D3-8B79-37D633B846F1}">
+                    <asvg:svgBlip xmlns:asvg="http://schemas.microsoft.com/office/drawing/2016/SVG/main" r:embed="rId5"/>
+                  </a:ext>
+                </a:extLst>
+              </a:blip>
+              <a:stretch>
+                <a:fillRect/>
+              </a:stretch>
+            </p:blipFill>
+            <p:spPr>
+              <a:xfrm>
+                <a:off x="6978603" y="3095373"/>
+                <a:ext cx="1217066" cy="1217066"/>
+              </a:xfrm>
+              <a:prstGeom prst="rect">
+                <a:avLst/>
+              </a:prstGeom>
+            </p:spPr>
+          </p:pic>
+        </p:grpSp>
+      </p:grpSp>
     </p:spTree>
     <p:extLst>
       <p:ext uri="{BB962C8B-B14F-4D97-AF65-F5344CB8AC3E}">

</xml_diff>